<commit_message>
ost pr1 created empty file
</commit_message>
<xml_diff>
--- a/3rd-Grade/Fifth-Semester/Тестирование/доклад.pptx
+++ b/3rd-Grade/Fifth-Semester/Тестирование/доклад.pptx
@@ -116,6 +116,11 @@
       </a:defRPr>
     </a:lvl9pPr>
   </p:defaultTextStyle>
+  <p:extLst>
+    <p:ext uri="{EFAFB233-063F-42B5-8137-9DF3F51BA10A}">
+      <p15:sldGuideLst xmlns:p15="http://schemas.microsoft.com/office/powerpoint/2012/main"/>
+    </p:ext>
+  </p:extLst>
 </p:presentation>
 </file>
 
@@ -214,7 +219,7 @@
           <a:effectLst/>
           <a:extLst>
             <a:ext uri="{91240B29-F687-4f45-9708-019B960494DF}">
-              <a14:hiddenLine xmlns:a14="http://schemas.microsoft.com/office/drawing/2010/main" xmlns="" w="9525">
+              <a14:hiddenLine xmlns="" xmlns:a14="http://schemas.microsoft.com/office/drawing/2010/main" w="9525">
                 <a:solidFill>
                   <a:srgbClr val="000000"/>
                 </a:solidFill>
@@ -407,7 +412,7 @@
             <a:fld id="{08B9EBBA-996F-894A-B54A-D6246ED52CEA}" type="datetimeFigureOut">
               <a:rPr lang="en-US" dirty="0"/>
               <a:pPr/>
-              <a:t>12/13/2021</a:t>
+              <a:t>12/17/2021</a:t>
             </a:fld>
             <a:endParaRPr lang="en-US" dirty="0"/>
           </a:p>
@@ -722,7 +727,7 @@
             <a:fld id="{18C79C5D-2A6F-F04D-97DA-BEF2467B64E4}" type="datetimeFigureOut">
               <a:rPr lang="en-US" dirty="0"/>
               <a:pPr/>
-              <a:t>12/13/2021</a:t>
+              <a:t>12/17/2021</a:t>
             </a:fld>
             <a:endParaRPr lang="en-US" dirty="0"/>
           </a:p>
@@ -1207,7 +1212,7 @@
             <a:fld id="{8DFA1846-DA80-1C48-A609-854EA85C59AD}" type="datetimeFigureOut">
               <a:rPr lang="en-US" dirty="0"/>
               <a:pPr/>
-              <a:t>12/13/2021</a:t>
+              <a:t>12/17/2021</a:t>
             </a:fld>
             <a:endParaRPr lang="en-US" dirty="0"/>
           </a:p>
@@ -1573,7 +1578,7 @@
             <a:fld id="{FBF54567-0DE4-3F47-BF90-CB84690072F9}" type="datetimeFigureOut">
               <a:rPr lang="en-US" dirty="0"/>
               <a:pPr/>
-              <a:t>12/13/2021</a:t>
+              <a:t>12/17/2021</a:t>
             </a:fld>
             <a:endParaRPr lang="en-US" dirty="0"/>
           </a:p>
@@ -1724,7 +1729,7 @@
           <a:ln/>
           <a:extLst>
             <a:ext uri="{91240B29-F687-4f45-9708-019B960494DF}">
-              <a14:hiddenLine xmlns:a14="http://schemas.microsoft.com/office/drawing/2010/main" xmlns="" w="9525">
+              <a14:hiddenLine xmlns="" xmlns:a14="http://schemas.microsoft.com/office/drawing/2010/main" w="9525">
                 <a:solidFill>
                   <a:srgbClr val="000000"/>
                 </a:solidFill>
@@ -1843,7 +1848,7 @@
             <a:fld id="{C6C52C72-DE31-F449-A4ED-4C594FD91407}" type="datetimeFigureOut">
               <a:rPr lang="en-US" dirty="0"/>
               <a:pPr/>
-              <a:t>12/13/2021</a:t>
+              <a:t>12/17/2021</a:t>
             </a:fld>
             <a:endParaRPr lang="en-US" dirty="0"/>
           </a:p>
@@ -1996,7 +2001,7 @@
           <a:ln/>
           <a:extLst>
             <a:ext uri="{91240B29-F687-4f45-9708-019B960494DF}">
-              <a14:hiddenLine xmlns:a14="http://schemas.microsoft.com/office/drawing/2010/main" xmlns="" w="9525">
+              <a14:hiddenLine xmlns="" xmlns:a14="http://schemas.microsoft.com/office/drawing/2010/main" w="9525">
                 <a:solidFill>
                   <a:srgbClr val="000000"/>
                 </a:solidFill>
@@ -2125,7 +2130,7 @@
             <a:fld id="{ED62726E-379B-B349-9EED-81ED093FA806}" type="datetimeFigureOut">
               <a:rPr lang="en-US" dirty="0"/>
               <a:pPr/>
-              <a:t>12/13/2021</a:t>
+              <a:t>12/17/2021</a:t>
             </a:fld>
             <a:endParaRPr lang="en-US" dirty="0"/>
           </a:p>
@@ -2276,7 +2281,7 @@
           <a:ln/>
           <a:extLst>
             <a:ext uri="{91240B29-F687-4f45-9708-019B960494DF}">
-              <a14:hiddenLine xmlns:a14="http://schemas.microsoft.com/office/drawing/2010/main" xmlns="" w="9525">
+              <a14:hiddenLine xmlns="" xmlns:a14="http://schemas.microsoft.com/office/drawing/2010/main" w="9525">
                 <a:solidFill>
                   <a:srgbClr val="000000"/>
                 </a:solidFill>
@@ -2405,7 +2410,7 @@
             <a:fld id="{9B3A1323-8D79-1946-B0D7-40001CF92E9D}" type="datetimeFigureOut">
               <a:rPr lang="en-US" dirty="0"/>
               <a:pPr/>
-              <a:t>12/13/2021</a:t>
+              <a:t>12/17/2021</a:t>
             </a:fld>
             <a:endParaRPr lang="en-US" dirty="0"/>
           </a:p>
@@ -2745,7 +2750,7 @@
             <a:fld id="{8DFA1846-DA80-1C48-A609-854EA85C59AD}" type="datetimeFigureOut">
               <a:rPr lang="en-US" dirty="0"/>
               <a:pPr/>
-              <a:t>12/13/2021</a:t>
+              <a:t>12/17/2021</a:t>
             </a:fld>
             <a:endParaRPr lang="en-US" dirty="0"/>
           </a:p>
@@ -2896,7 +2901,7 @@
           <a:ln/>
           <a:extLst>
             <a:ext uri="{91240B29-F687-4f45-9708-019B960494DF}">
-              <a14:hiddenLine xmlns:a14="http://schemas.microsoft.com/office/drawing/2010/main" xmlns="" w="9525">
+              <a14:hiddenLine xmlns="" xmlns:a14="http://schemas.microsoft.com/office/drawing/2010/main" w="9525">
                 <a:solidFill>
                   <a:srgbClr val="000000"/>
                 </a:solidFill>
@@ -3081,7 +3086,7 @@
             <a:fld id="{57302355-E14B-8545-A8F8-0FE83CC9D524}" type="datetimeFigureOut">
               <a:rPr lang="en-US" dirty="0"/>
               <a:pPr/>
-              <a:t>12/13/2021</a:t>
+              <a:t>12/17/2021</a:t>
             </a:fld>
             <a:endParaRPr lang="en-US" dirty="0"/>
           </a:p>
@@ -3232,7 +3237,7 @@
           <a:ln/>
           <a:extLst>
             <a:ext uri="{91240B29-F687-4f45-9708-019B960494DF}">
-              <a14:hiddenLine xmlns:a14="http://schemas.microsoft.com/office/drawing/2010/main" xmlns="" w="9525">
+              <a14:hiddenLine xmlns="" xmlns:a14="http://schemas.microsoft.com/office/drawing/2010/main" w="9525">
                 <a:solidFill>
                   <a:srgbClr val="000000"/>
                 </a:solidFill>
@@ -3555,7 +3560,7 @@
             <a:fld id="{02640F58-564D-2B4F-AE67-E407BA4FCF45}" type="datetimeFigureOut">
               <a:rPr lang="en-US" dirty="0"/>
               <a:pPr/>
-              <a:t>12/13/2021</a:t>
+              <a:t>12/17/2021</a:t>
             </a:fld>
             <a:endParaRPr lang="en-US" dirty="0"/>
           </a:p>
@@ -3706,7 +3711,7 @@
           <a:ln/>
           <a:extLst>
             <a:ext uri="{91240B29-F687-4f45-9708-019B960494DF}">
-              <a14:hiddenLine xmlns:a14="http://schemas.microsoft.com/office/drawing/2010/main" xmlns="" w="9525">
+              <a14:hiddenLine xmlns="" xmlns:a14="http://schemas.microsoft.com/office/drawing/2010/main" w="9525">
                 <a:solidFill>
                   <a:srgbClr val="000000"/>
                 </a:solidFill>
@@ -3773,7 +3778,7 @@
             <a:fld id="{F13A34C8-038E-2045-AF43-DF7DBB8E0E9E}" type="datetimeFigureOut">
               <a:rPr lang="en-US" dirty="0"/>
               <a:pPr/>
-              <a:t>12/13/2021</a:t>
+              <a:t>12/17/2021</a:t>
             </a:fld>
             <a:endParaRPr lang="en-US" dirty="0"/>
           </a:p>
@@ -3865,7 +3870,7 @@
             <a:fld id="{8818C68F-D26B-8F47-958C-23B49CF8A634}" type="datetimeFigureOut">
               <a:rPr lang="en-US" dirty="0"/>
               <a:pPr/>
-              <a:t>12/13/2021</a:t>
+              <a:t>12/17/2021</a:t>
             </a:fld>
             <a:endParaRPr lang="en-US" dirty="0"/>
           </a:p>
@@ -4129,7 +4134,7 @@
           <a:ln/>
           <a:extLst>
             <a:ext uri="{91240B29-F687-4f45-9708-019B960494DF}">
-              <a14:hiddenLine xmlns:a14="http://schemas.microsoft.com/office/drawing/2010/main" xmlns="" w="9525">
+              <a14:hiddenLine xmlns="" xmlns:a14="http://schemas.microsoft.com/office/drawing/2010/main" w="9525">
                 <a:solidFill>
                   <a:srgbClr val="000000"/>
                 </a:solidFill>
@@ -4329,7 +4334,7 @@
             <a:fld id="{D0DF5E60-9974-AC48-9591-99C2BB44B7CF}" type="datetimeFigureOut">
               <a:rPr lang="en-US" dirty="0"/>
               <a:pPr/>
-              <a:t>12/13/2021</a:t>
+              <a:t>12/17/2021</a:t>
             </a:fld>
             <a:endParaRPr lang="en-US" dirty="0"/>
           </a:p>
@@ -4639,7 +4644,7 @@
             <a:fld id="{18C79C5D-2A6F-F04D-97DA-BEF2467B64E4}" type="datetimeFigureOut">
               <a:rPr lang="en-US" dirty="0"/>
               <a:pPr/>
-              <a:t>12/13/2021</a:t>
+              <a:t>12/17/2021</a:t>
             </a:fld>
             <a:endParaRPr lang="en-US" dirty="0"/>
           </a:p>
@@ -4906,7 +4911,7 @@
             <a:fld id="{09B482E8-6E0E-1B4F-B1FD-C69DB9E858D9}" type="datetimeFigureOut">
               <a:rPr lang="en-US" dirty="0"/>
               <a:pPr/>
-              <a:t>12/13/2021</a:t>
+              <a:t>12/17/2021</a:t>
             </a:fld>
             <a:endParaRPr lang="en-US" dirty="0"/>
           </a:p>
@@ -5677,6 +5682,18 @@
   <p:clrMapOvr>
     <a:masterClrMapping/>
   </p:clrMapOvr>
+  <mc:AlternateContent xmlns:mc="http://schemas.openxmlformats.org/markup-compatibility/2006">
+    <mc:Choice xmlns:p14="http://schemas.microsoft.com/office/powerpoint/2010/main" Requires="p14">
+      <p:transition spd="slow" p14:dur="1300">
+        <p14:pan dir="u"/>
+      </p:transition>
+    </mc:Choice>
+    <mc:Fallback>
+      <p:transition spd="slow">
+        <p:fade/>
+      </p:transition>
+    </mc:Fallback>
+  </mc:AlternateContent>
 </p:sld>
 </file>
 
@@ -5785,6 +5802,18 @@
   <p:clrMapOvr>
     <a:masterClrMapping/>
   </p:clrMapOvr>
+  <mc:AlternateContent xmlns:mc="http://schemas.openxmlformats.org/markup-compatibility/2006">
+    <mc:Choice xmlns:p14="http://schemas.microsoft.com/office/powerpoint/2010/main" Requires="p14">
+      <p:transition spd="slow" p14:dur="1300">
+        <p14:pan dir="u"/>
+      </p:transition>
+    </mc:Choice>
+    <mc:Fallback>
+      <p:transition spd="slow">
+        <p:fade/>
+      </p:transition>
+    </mc:Fallback>
+  </mc:AlternateContent>
 </p:sld>
 </file>
 
@@ -5890,6 +5919,18 @@
   <p:clrMapOvr>
     <a:masterClrMapping/>
   </p:clrMapOvr>
+  <mc:AlternateContent xmlns:mc="http://schemas.openxmlformats.org/markup-compatibility/2006">
+    <mc:Choice xmlns:p14="http://schemas.microsoft.com/office/powerpoint/2010/main" Requires="p14">
+      <p:transition spd="slow" p14:dur="1300">
+        <p14:pan dir="u"/>
+      </p:transition>
+    </mc:Choice>
+    <mc:Fallback>
+      <p:transition spd="slow">
+        <p:fade/>
+      </p:transition>
+    </mc:Fallback>
+  </mc:AlternateContent>
 </p:sld>
 </file>
 
@@ -6035,6 +6076,18 @@
   <p:clrMapOvr>
     <a:masterClrMapping/>
   </p:clrMapOvr>
+  <mc:AlternateContent xmlns:mc="http://schemas.openxmlformats.org/markup-compatibility/2006">
+    <mc:Choice xmlns:p14="http://schemas.microsoft.com/office/powerpoint/2010/main" Requires="p14">
+      <p:transition spd="slow" p14:dur="1300">
+        <p14:pan dir="u"/>
+      </p:transition>
+    </mc:Choice>
+    <mc:Fallback>
+      <p:transition spd="slow">
+        <p:fade/>
+      </p:transition>
+    </mc:Fallback>
+  </mc:AlternateContent>
 </p:sld>
 </file>
 
@@ -6100,6 +6153,18 @@
   <p:clrMapOvr>
     <a:masterClrMapping/>
   </p:clrMapOvr>
+  <mc:AlternateContent xmlns:mc="http://schemas.openxmlformats.org/markup-compatibility/2006">
+    <mc:Choice xmlns:p14="http://schemas.microsoft.com/office/powerpoint/2010/main" Requires="p14">
+      <p:transition spd="slow" p14:dur="1300">
+        <p14:pan dir="u"/>
+      </p:transition>
+    </mc:Choice>
+    <mc:Fallback>
+      <p:transition spd="slow">
+        <p:fade/>
+      </p:transition>
+    </mc:Fallback>
+  </mc:AlternateContent>
 </p:sld>
 </file>
 
@@ -6217,6 +6282,18 @@
   <p:clrMapOvr>
     <a:masterClrMapping/>
   </p:clrMapOvr>
+  <mc:AlternateContent xmlns:mc="http://schemas.openxmlformats.org/markup-compatibility/2006">
+    <mc:Choice xmlns:p14="http://schemas.microsoft.com/office/powerpoint/2010/main" Requires="p14">
+      <p:transition spd="slow" p14:dur="1300">
+        <p14:pan dir="u"/>
+      </p:transition>
+    </mc:Choice>
+    <mc:Fallback>
+      <p:transition spd="slow">
+        <p:fade/>
+      </p:transition>
+    </mc:Fallback>
+  </mc:AlternateContent>
 </p:sld>
 </file>
 
@@ -6355,6 +6432,18 @@
   <p:clrMapOvr>
     <a:masterClrMapping/>
   </p:clrMapOvr>
+  <mc:AlternateContent xmlns:mc="http://schemas.openxmlformats.org/markup-compatibility/2006">
+    <mc:Choice xmlns:p14="http://schemas.microsoft.com/office/powerpoint/2010/main" Requires="p14">
+      <p:transition spd="slow" p14:dur="1300">
+        <p14:pan dir="u"/>
+      </p:transition>
+    </mc:Choice>
+    <mc:Fallback>
+      <p:transition spd="slow">
+        <p:fade/>
+      </p:transition>
+    </mc:Fallback>
+  </mc:AlternateContent>
 </p:sld>
 </file>
 
@@ -6478,6 +6567,18 @@
   <p:clrMapOvr>
     <a:masterClrMapping/>
   </p:clrMapOvr>
+  <mc:AlternateContent xmlns:mc="http://schemas.openxmlformats.org/markup-compatibility/2006">
+    <mc:Choice xmlns:p14="http://schemas.microsoft.com/office/powerpoint/2010/main" Requires="p14">
+      <p:transition spd="slow" p14:dur="1300">
+        <p14:pan dir="u"/>
+      </p:transition>
+    </mc:Choice>
+    <mc:Fallback>
+      <p:transition spd="slow">
+        <p:fade/>
+      </p:transition>
+    </mc:Fallback>
+  </mc:AlternateContent>
 </p:sld>
 </file>
 
@@ -6590,6 +6691,18 @@
   <p:clrMapOvr>
     <a:masterClrMapping/>
   </p:clrMapOvr>
+  <mc:AlternateContent xmlns:mc="http://schemas.openxmlformats.org/markup-compatibility/2006">
+    <mc:Choice xmlns:p14="http://schemas.microsoft.com/office/powerpoint/2010/main" Requires="p14">
+      <p:transition spd="slow" p14:dur="1300">
+        <p14:pan dir="u"/>
+      </p:transition>
+    </mc:Choice>
+    <mc:Fallback>
+      <p:transition spd="slow">
+        <p:fade/>
+      </p:transition>
+    </mc:Fallback>
+  </mc:AlternateContent>
 </p:sld>
 </file>
 
@@ -6698,6 +6811,18 @@
   <p:clrMapOvr>
     <a:masterClrMapping/>
   </p:clrMapOvr>
+  <mc:AlternateContent xmlns:mc="http://schemas.openxmlformats.org/markup-compatibility/2006">
+    <mc:Choice xmlns:p14="http://schemas.microsoft.com/office/powerpoint/2010/main" Requires="p14">
+      <p:transition spd="slow" p14:dur="1300">
+        <p14:pan dir="u"/>
+      </p:transition>
+    </mc:Choice>
+    <mc:Fallback>
+      <p:transition spd="slow">
+        <p:fade/>
+      </p:transition>
+    </mc:Fallback>
+  </mc:AlternateContent>
 </p:sld>
 </file>
 
@@ -6806,6 +6931,18 @@
   <p:clrMapOvr>
     <a:masterClrMapping/>
   </p:clrMapOvr>
+  <mc:AlternateContent xmlns:mc="http://schemas.openxmlformats.org/markup-compatibility/2006">
+    <mc:Choice xmlns:p14="http://schemas.microsoft.com/office/powerpoint/2010/main" Requires="p14">
+      <p:transition spd="slow" p14:dur="1300">
+        <p14:pan dir="u"/>
+      </p:transition>
+    </mc:Choice>
+    <mc:Fallback>
+      <p:transition spd="slow">
+        <p:fade/>
+      </p:transition>
+    </mc:Fallback>
+  </mc:AlternateContent>
 </p:sld>
 </file>
 
@@ -6967,6 +7104,18 @@
   <p:clrMapOvr>
     <a:masterClrMapping/>
   </p:clrMapOvr>
+  <mc:AlternateContent xmlns:mc="http://schemas.openxmlformats.org/markup-compatibility/2006">
+    <mc:Choice xmlns:p14="http://schemas.microsoft.com/office/powerpoint/2010/main" Requires="p14">
+      <p:transition spd="slow" p14:dur="1300">
+        <p14:pan dir="u"/>
+      </p:transition>
+    </mc:Choice>
+    <mc:Fallback>
+      <p:transition spd="slow">
+        <p:fade/>
+      </p:transition>
+    </mc:Fallback>
+  </mc:AlternateContent>
 </p:sld>
 </file>
 
@@ -7075,6 +7224,18 @@
   <p:clrMapOvr>
     <a:masterClrMapping/>
   </p:clrMapOvr>
+  <mc:AlternateContent xmlns:mc="http://schemas.openxmlformats.org/markup-compatibility/2006">
+    <mc:Choice xmlns:p14="http://schemas.microsoft.com/office/powerpoint/2010/main" Requires="p14">
+      <p:transition spd="slow" p14:dur="1300">
+        <p14:pan dir="u"/>
+      </p:transition>
+    </mc:Choice>
+    <mc:Fallback>
+      <p:transition spd="slow">
+        <p:fade/>
+      </p:transition>
+    </mc:Fallback>
+  </mc:AlternateContent>
 </p:sld>
 </file>
 

</xml_diff>